<commit_message>
Data 211 Project Slide Presentation
This is the slideshow and speaker notes that will be submitted on D2L and be used for the in-class presentation on 4/21/22.
</commit_message>
<xml_diff>
--- a/Data211 Project.pptx
+++ b/Data211 Project.pptx
@@ -893,7 +893,12 @@
               <a:buNone/>
             </a:pPr>
             <a:r>
-              <a:t/>
+              <a:rPr lang="en"/>
+              <a:t>That </a:t>
+            </a:r>
+            <a:r>
+              <a:rPr lang="en"/>
+              <a:t>brings me to the end of the presentation. My last slide here has a link to and the URL for my Github repository. Thank you all for your time and attention. </a:t>
             </a:r>
             <a:endParaRPr/>
           </a:p>
@@ -992,7 +997,78 @@
               <a:buNone/>
             </a:pPr>
             <a:r>
+              <a:rPr lang="en"/>
+              <a:t>As I thought about this project, I knew that I wanted to take a look at my free time. I don’t have a lot of it these days, so I thought it would be valuable to gain some insight on it. That said, my main two leisure activities are playing video games and reading. When I started collecting my data, I wasn’t too sure </a:t>
+            </a:r>
+            <a:r>
+              <a:rPr i="1" lang="en"/>
+              <a:t>exactly </a:t>
+            </a:r>
+            <a:r>
+              <a:rPr lang="en"/>
+              <a:t>what question I wanted to answer, so I chose to be as specific in my collection as possible to start. I split my reading into 3 categories: fiction, non-fiction, and comics. Additionally, I also tracked the time I spent playing video games. </a:t>
+            </a:r>
+            <a:endParaRPr/>
+          </a:p>
+          <a:p>
+            <a:pPr indent="0" lvl="0" marL="0" rtl="0" algn="l">
+              <a:spcBef>
+                <a:spcPts val="0"/>
+              </a:spcBef>
+              <a:spcAft>
+                <a:spcPts val="0"/>
+              </a:spcAft>
+              <a:buNone/>
+            </a:pPr>
+            <a:r>
               <a:t/>
+            </a:r>
+            <a:endParaRPr/>
+          </a:p>
+          <a:p>
+            <a:pPr indent="0" lvl="0" marL="0" rtl="0" algn="l">
+              <a:spcBef>
+                <a:spcPts val="0"/>
+              </a:spcBef>
+              <a:spcAft>
+                <a:spcPts val="0"/>
+              </a:spcAft>
+              <a:buNone/>
+            </a:pPr>
+            <a:r>
+              <a:t/>
+            </a:r>
+            <a:endParaRPr/>
+          </a:p>
+          <a:p>
+            <a:pPr indent="0" lvl="0" marL="0" rtl="0" algn="l">
+              <a:spcBef>
+                <a:spcPts val="0"/>
+              </a:spcBef>
+              <a:spcAft>
+                <a:spcPts val="0"/>
+              </a:spcAft>
+              <a:buNone/>
+            </a:pPr>
+            <a:r>
+              <a:rPr lang="en"/>
+              <a:t>To </a:t>
+            </a:r>
+            <a:r>
+              <a:rPr i="1" lang="en"/>
+              <a:t>collect </a:t>
+            </a:r>
+            <a:r>
+              <a:rPr lang="en"/>
+              <a:t>this data, I went with a tried-and-true method, the stopwatch. </a:t>
+            </a:r>
+            <a:r>
+              <a:rPr lang="en"/>
+              <a:t>Whenever</a:t>
+            </a:r>
+            <a:r>
+              <a:rPr lang="en"/>
+              <a:t> I was about to start reading or gaming, I would pull out my phone’s Clock app and start the stopwatch, and then I would pause the stopwatch when I was done. This may not have been the most elegant method, but it allowed me to be accurate with my time tracking. I tracked this data from April 1st through April 15th, a total of 15 days worth of data on my leisure activities. </a:t>
             </a:r>
             <a:endParaRPr/>
           </a:p>
@@ -1091,7 +1167,87 @@
               <a:buNone/>
             </a:pPr>
             <a:r>
-              <a:t/>
+              <a:rPr lang="en"/>
+              <a:t>On this next slide, we can see a screenshot showing the first 28 individuals in my data set. The data set was named simply “reading_gaming”, and there are three variables: Activity, Time (measured in minutes), and Date. </a:t>
+            </a:r>
+            <a:endParaRPr/>
+          </a:p>
+          <a:p>
+            <a:pPr indent="-317500" lvl="0" marL="457200" rtl="0" algn="l">
+              <a:spcBef>
+                <a:spcPts val="0"/>
+              </a:spcBef>
+              <a:spcAft>
+                <a:spcPts val="0"/>
+              </a:spcAft>
+              <a:buSzPts val="1400"/>
+              <a:buAutoNum type="arabicPeriod"/>
+            </a:pPr>
+            <a:r>
+              <a:rPr lang="en"/>
+              <a:t>Activity is a categorical variable, which consists of the 4 categories I listed on the previous slide: Video Game, Fiction, Non-fiction, and Comic. </a:t>
+            </a:r>
+            <a:endParaRPr/>
+          </a:p>
+          <a:p>
+            <a:pPr indent="-317500" lvl="0" marL="457200" rtl="0" algn="l">
+              <a:spcBef>
+                <a:spcPts val="0"/>
+              </a:spcBef>
+              <a:spcAft>
+                <a:spcPts val="0"/>
+              </a:spcAft>
+              <a:buSzPts val="1400"/>
+              <a:buAutoNum type="arabicPeriod"/>
+            </a:pPr>
+            <a:r>
+              <a:rPr lang="en"/>
+              <a:t>Time is a </a:t>
+            </a:r>
+            <a:r>
+              <a:rPr lang="en"/>
+              <a:t>numeric</a:t>
+            </a:r>
+            <a:r>
+              <a:rPr lang="en"/>
+              <a:t> variable that simply lists out the total </a:t>
+            </a:r>
+            <a:r>
+              <a:rPr lang="en"/>
+              <a:t>minutes</a:t>
+            </a:r>
+            <a:r>
+              <a:rPr lang="en"/>
+              <a:t> spent on the activity in a </a:t>
+            </a:r>
+            <a:r>
+              <a:rPr lang="en"/>
+              <a:t>single session. </a:t>
+            </a:r>
+            <a:r>
+              <a:rPr lang="en">
+                <a:solidFill>
+                  <a:schemeClr val="dk1"/>
+                </a:solidFill>
+              </a:rPr>
+              <a:t>I decided to use whole numbers for this column. In my data collection I would round up if I was 30-seconds or more through the current minute and round down if I was under 30-seconds through the minute. </a:t>
+            </a:r>
+            <a:endParaRPr/>
+          </a:p>
+          <a:p>
+            <a:pPr indent="-317500" lvl="0" marL="457200" rtl="0" algn="l">
+              <a:spcBef>
+                <a:spcPts val="0"/>
+              </a:spcBef>
+              <a:spcAft>
+                <a:spcPts val="0"/>
+              </a:spcAft>
+              <a:buSzPts val="1400"/>
+              <a:buAutoNum type="arabicPeriod"/>
+            </a:pPr>
+            <a:r>
+              <a:rPr lang="en"/>
+              <a:t>My last variable is Date, which I have listed here as a categorical variable. I decided this was categorical, since I would use it to group data later on in my analysis. This grouping by date will be very important in testing my hypothesis, as we’ll see shortly. </a:t>
             </a:r>
             <a:endParaRPr/>
           </a:p>
@@ -1190,7 +1346,55 @@
               <a:buNone/>
             </a:pPr>
             <a:r>
+              <a:rPr lang="en"/>
+              <a:t>Finally, we come to my hypothesis, or question, to be tested. I decided upon this question about halfway through my collection process, as I noticed how inconsistent my leisure time was from day to day. Since reading is very important to me, I decided to focus my question on how much time I have actually been able to devote to it. I landed upon my question: Is the average amount of leisure time I spend reading per </a:t>
+            </a:r>
+            <a:r>
+              <a:rPr lang="en"/>
+              <a:t>day</a:t>
+            </a:r>
+            <a:r>
+              <a:rPr lang="en"/>
+              <a:t> </a:t>
+            </a:r>
+            <a:r>
+              <a:rPr b="1" lang="en"/>
+              <a:t>greater </a:t>
+            </a:r>
+            <a:r>
+              <a:rPr lang="en"/>
+              <a:t>than 30 minutes. </a:t>
+            </a:r>
+            <a:endParaRPr/>
+          </a:p>
+          <a:p>
+            <a:pPr indent="0" lvl="0" marL="0" rtl="0" algn="l">
+              <a:spcBef>
+                <a:spcPts val="0"/>
+              </a:spcBef>
+              <a:spcAft>
+                <a:spcPts val="0"/>
+              </a:spcAft>
+              <a:buNone/>
+            </a:pPr>
+            <a:r>
               <a:t/>
+            </a:r>
+            <a:endParaRPr/>
+          </a:p>
+          <a:p>
+            <a:pPr indent="0" lvl="0" marL="0" rtl="0" algn="l">
+              <a:spcBef>
+                <a:spcPts val="0"/>
+              </a:spcBef>
+              <a:spcAft>
+                <a:spcPts val="0"/>
+              </a:spcAft>
+              <a:buNone/>
+            </a:pPr>
+            <a:r>
+              <a:rPr lang="en"/>
+              <a:t>We can see on the bottom-left side of my slide that I identified my null hypothesis as mu of reading is equal to 30 and my alternative hypothesis as mu of reading is greater than 30. </a:t>
             </a:r>
             <a:endParaRPr/>
           </a:p>
@@ -1289,7 +1493,58 @@
               <a:buNone/>
             </a:pPr>
             <a:r>
-              <a:t/>
+              <a:rPr lang="en"/>
+              <a:t>After</a:t>
+            </a:r>
+            <a:r>
+              <a:rPr lang="en"/>
+              <a:t> gathering all of my data, I needed to do some data wrangling before testing my hypothesis. There were two main questions I had to ask: Is there missing data? And how do I total my reading time? </a:t>
+            </a:r>
+            <a:endParaRPr/>
+          </a:p>
+          <a:p>
+            <a:pPr indent="-317500" lvl="0" marL="457200" rtl="0" algn="l">
+              <a:spcBef>
+                <a:spcPts val="0"/>
+              </a:spcBef>
+              <a:spcAft>
+                <a:spcPts val="0"/>
+              </a:spcAft>
+              <a:buSzPts val="1400"/>
+              <a:buAutoNum type="arabicPeriod"/>
+            </a:pPr>
+            <a:r>
+              <a:rPr lang="en"/>
+              <a:t>Regarding the missing data question, when I first started looking at the data, I noticed that I didn’t read or game at all on April 8th. I decided that the type of reading I recorded wouldn’t affect my calculations at all, so I added a data point to reflect 0 time spent reading on that date. </a:t>
+            </a:r>
+            <a:endParaRPr/>
+          </a:p>
+          <a:p>
+            <a:pPr indent="-317500" lvl="0" marL="457200" rtl="0" algn="l">
+              <a:spcBef>
+                <a:spcPts val="0"/>
+              </a:spcBef>
+              <a:spcAft>
+                <a:spcPts val="0"/>
+              </a:spcAft>
+              <a:buSzPts val="1400"/>
+              <a:buAutoNum type="arabicPeriod"/>
+            </a:pPr>
+            <a:r>
+              <a:rPr lang="en"/>
+              <a:t>For my second question, I had to put a bit more thought into the answer. Since I didn’t need the gaming data and my reading data was separated into three separate categories, I needed to think back to our data wrangling lesson and use some of what I learned there. On the bottom-right, we can see the code I landed on. First, I used the filter function to filter out gaming time. Then, I piped that into a group_by() function to group the reading data by date, and finally I added a summarize function to sum up the total time spent reading on each date. </a:t>
+            </a:r>
+            <a:r>
+              <a:rPr lang="en">
+                <a:highlight>
+                  <a:schemeClr val="accent4"/>
+                </a:highlight>
+              </a:rPr>
+              <a:t>I stored this data in a list called daily_reading</a:t>
+            </a:r>
+            <a:r>
+              <a:rPr lang="en"/>
+              <a:t>, which we can now see above my code. </a:t>
             </a:r>
             <a:endParaRPr/>
           </a:p>
@@ -1388,7 +1643,28 @@
               <a:buNone/>
             </a:pPr>
             <a:r>
-              <a:t/>
+              <a:rPr lang="en"/>
+              <a:t>From there, I was </a:t>
+            </a:r>
+            <a:r>
+              <a:rPr lang="en"/>
+              <a:t>curious</a:t>
+            </a:r>
+            <a:r>
+              <a:rPr lang="en"/>
+              <a:t> to see my daily_reading data displayed visually. I used ggplot to make a scatter plot of the data, and I decided to include a regression line in my graph. It looked like my time spent reading per day did trend down slightly throughout the 15 days, and the regression line showed that, but it didn’t look to me like a particularly strong fit. I decided to put some numbers to that, so I used the lm() and summary() functions, as we see on the bottom left. In the output, the R-squared value was calculated as 0.152, </a:t>
+            </a:r>
+            <a:r>
+              <a:rPr lang="en">
+                <a:highlight>
+                  <a:schemeClr val="accent4"/>
+                </a:highlight>
+              </a:rPr>
+              <a:t>which backs up my instinct that the regression line was a weak fit to the data.</a:t>
+            </a:r>
+            <a:r>
+              <a:rPr lang="en"/>
+              <a:t> </a:t>
             </a:r>
             <a:endParaRPr/>
           </a:p>
@@ -1487,7 +1763,52 @@
               <a:buNone/>
             </a:pPr>
             <a:r>
-              <a:t/>
+              <a:rPr lang="en"/>
+              <a:t>Finally, it was time actually test my hypothesis. I used a t.test on my daily_reading data, and it showed a few things. First, my </a:t>
+            </a:r>
+            <a:r>
+              <a:rPr i="1" lang="en"/>
+              <a:t>sample mean</a:t>
+            </a:r>
+            <a:r>
+              <a:rPr lang="en"/>
+              <a:t> was 40.53, so I </a:t>
+            </a:r>
+            <a:r>
+              <a:rPr i="1" lang="en"/>
+              <a:t>did </a:t>
+            </a:r>
+            <a:r>
+              <a:rPr lang="en"/>
+              <a:t>actually read for more than 30 minutes per day on average during the data collection period. However, </a:t>
+            </a:r>
+            <a:r>
+              <a:rPr lang="en">
+                <a:highlight>
+                  <a:schemeClr val="accent4"/>
+                </a:highlight>
+              </a:rPr>
+              <a:t>the p-value is more important to answer my question</a:t>
+            </a:r>
+            <a:r>
+              <a:rPr lang="en"/>
+              <a:t> of whether I read more than 30 minutes </a:t>
+            </a:r>
+            <a:r>
+              <a:rPr i="1" lang="en"/>
+              <a:t>every </a:t>
+            </a:r>
+            <a:r>
+              <a:rPr lang="en"/>
+              <a:t>day</a:t>
+            </a:r>
+            <a:r>
+              <a:rPr i="1" lang="en"/>
+              <a:t>. </a:t>
+            </a:r>
+            <a:r>
+              <a:rPr lang="en"/>
+              <a:t>That p-value was calculated as 0.062.</a:t>
             </a:r>
             <a:endParaRPr/>
           </a:p>
@@ -1586,6 +1907,62 @@
               <a:buNone/>
             </a:pPr>
             <a:r>
+              <a:rPr lang="en"/>
+              <a:t>In conclusion, since my p-value of 0.062 was greater than 0.05, I fail to reject the null hypothesis. There is not sufficient evidence to support the claim that my average daily time spent reading for pleasure is greater than 30 minutes. That conclusion brings me </a:t>
+            </a:r>
+            <a:r>
+              <a:rPr lang="en"/>
+              <a:t>back</a:t>
+            </a:r>
+            <a:r>
+              <a:rPr lang="en"/>
+              <a:t> to the</a:t>
+            </a:r>
+            <a:r>
+              <a:rPr lang="en">
+                <a:highlight>
+                  <a:schemeClr val="accent4"/>
+                </a:highlight>
+              </a:rPr>
+              <a:t> title of this presentation, leisure goals…</a:t>
+            </a:r>
+            <a:endParaRPr>
+              <a:highlight>
+                <a:schemeClr val="accent4"/>
+              </a:highlight>
+            </a:endParaRPr>
+          </a:p>
+          <a:p>
+            <a:pPr indent="0" lvl="0" marL="0" rtl="0" algn="l">
+              <a:spcBef>
+                <a:spcPts val="0"/>
+              </a:spcBef>
+              <a:spcAft>
+                <a:spcPts val="0"/>
+              </a:spcAft>
+              <a:buClr>
+                <a:schemeClr val="dk1"/>
+              </a:buClr>
+              <a:buSzPts val="1100"/>
+              <a:buFont typeface="Arial"/>
+              <a:buNone/>
+            </a:pPr>
+            <a:r>
+              <a:t/>
+            </a:r>
+            <a:endParaRPr/>
+          </a:p>
+          <a:p>
+            <a:pPr indent="0" lvl="0" marL="0" rtl="0" algn="l">
+              <a:spcBef>
+                <a:spcPts val="0"/>
+              </a:spcBef>
+              <a:spcAft>
+                <a:spcPts val="0"/>
+              </a:spcAft>
+              <a:buNone/>
+            </a:pPr>
+            <a:r>
               <a:t/>
             </a:r>
             <a:endParaRPr/>
@@ -1685,7 +2062,8 @@
               <a:buNone/>
             </a:pPr>
             <a:r>
-              <a:t/>
+              <a:rPr lang="en"/>
+              <a:t>What is my leisure goal? Find more time to read!</a:t>
             </a:r>
             <a:endParaRPr/>
           </a:p>
@@ -7102,7 +7480,7 @@
             </a:pPr>
             <a:r>
               <a:rPr lang="en"/>
-              <a:t>Zachary “DoctorFarmer” Farmer</a:t>
+              <a:t>Zachary Farmer</a:t>
             </a:r>
             <a:endParaRPr/>
           </a:p>
@@ -7167,7 +7545,7 @@
             </a:pPr>
             <a:r>
               <a:rPr lang="en"/>
-              <a:t>DoctorFarmer on GitHub</a:t>
+              <a:t>Portfolio</a:t>
             </a:r>
             <a:endParaRPr/>
           </a:p>
@@ -7982,18 +8360,18 @@
               <a:buNone/>
             </a:pPr>
             <a:r>
-              <a:rPr i="1" lang="en"/>
-              <a:t>Is the average amount of time I spend reading per day </a:t>
-            </a:r>
-            <a:r>
-              <a:rPr b="1" i="1" lang="en"/>
+              <a:rPr i="1" lang="en" sz="1700"/>
+              <a:t>Is the average amount of leisure time I spend reading per day </a:t>
+            </a:r>
+            <a:r>
+              <a:rPr b="1" i="1" lang="en" sz="1700"/>
               <a:t>greater </a:t>
             </a:r>
             <a:r>
-              <a:rPr i="1" lang="en"/>
+              <a:rPr i="1" lang="en" sz="1700"/>
               <a:t>than 30 minutes?</a:t>
             </a:r>
-            <a:endParaRPr i="1"/>
+            <a:endParaRPr i="1" sz="1700"/>
           </a:p>
           <a:p>
             <a:pPr indent="0" lvl="0" marL="0" rtl="0" algn="l">
@@ -8317,7 +8695,7 @@
             </a:pPr>
             <a:r>
               <a:rPr lang="en" sz="1400"/>
-              <a:t>On 4/08/22, I didn’t spend any time reading. To make sure this date was accounted for, I added an additional data point of 0 minutes reading fiction on April 8. </a:t>
+              <a:t>On 4/08/22, I didn’t spend any time reading. I needed to add a data point to reflect this in my daily average. </a:t>
             </a:r>
             <a:endParaRPr sz="1400"/>
           </a:p>
@@ -8361,7 +8739,7 @@
                   <a:schemeClr val="accent5"/>
                 </a:solidFill>
               </a:rPr>
-              <a:t>How do I total reading time?</a:t>
+              <a:t>How do I total my reading time?</a:t>
             </a:r>
             <a:endParaRPr sz="2000">
               <a:solidFill>
@@ -8431,7 +8809,7 @@
             </a:pPr>
             <a:r>
               <a:rPr lang="en" sz="1400"/>
-              <a:t>Since total reading data was collected in three different categories (fiction, non-fiction, and comics), and I didn’t need my Video Game data at all, I used the filter, group_by and summarize functions to find daily reading totals, stored as daily_reading. </a:t>
+              <a:t>I need to filter out the video game time, group by date, and find the daily sum of time spent reading. This data will be stored in a list as “daily_reading”.</a:t>
             </a:r>
             <a:endParaRPr sz="1400"/>
           </a:p>
@@ -9363,7 +9741,7 @@
             </a:pPr>
             <a:r>
               <a:rPr lang="en"/>
-              <a:t>Result</a:t>
+              <a:t>Conclusion</a:t>
             </a:r>
             <a:endParaRPr/>
           </a:p>
@@ -9451,6 +9829,285 @@
 </file>
 
 <file path=ppt/theme/theme1.xml><?xml version="1.0" encoding="utf-8"?>
+<a:theme xmlns:a="http://schemas.openxmlformats.org/drawingml/2006/main" xmlns:r="http://schemas.openxmlformats.org/officeDocument/2006/relationships" name="Marina">
+  <a:themeElements>
+    <a:clrScheme name="Marina">
+      <a:dk1>
+        <a:srgbClr val="FFFFFF"/>
+      </a:dk1>
+      <a:lt1>
+        <a:srgbClr val="00517C"/>
+      </a:lt1>
+      <a:dk2>
+        <a:srgbClr val="004065"/>
+      </a:dk2>
+      <a:lt2>
+        <a:srgbClr val="CFD8DC"/>
+      </a:lt2>
+      <a:accent1>
+        <a:srgbClr val="0277BD"/>
+      </a:accent1>
+      <a:accent2>
+        <a:srgbClr val="558B2F"/>
+      </a:accent2>
+      <a:accent3>
+        <a:srgbClr val="009688"/>
+      </a:accent3>
+      <a:accent4>
+        <a:srgbClr val="039BE5"/>
+      </a:accent4>
+      <a:accent5>
+        <a:srgbClr val="8BC34A"/>
+      </a:accent5>
+      <a:accent6>
+        <a:srgbClr val="FFEB38"/>
+      </a:accent6>
+      <a:hlink>
+        <a:srgbClr val="8BC34A"/>
+      </a:hlink>
+      <a:folHlink>
+        <a:srgbClr val="8BC34A"/>
+      </a:folHlink>
+    </a:clrScheme>
+    <a:fontScheme name="Office">
+      <a:majorFont>
+        <a:latin typeface="Arial"/>
+        <a:ea typeface=""/>
+        <a:cs typeface=""/>
+        <a:font script="Jpan" typeface="ＭＳ Ｐゴシック"/>
+        <a:font script="Hang" typeface="맑은 고딕"/>
+        <a:font script="Hans" typeface="宋体"/>
+        <a:font script="Hant" typeface="新細明體"/>
+        <a:font script="Arab" typeface="Times New Roman"/>
+        <a:font script="Hebr" typeface="Times New Roman"/>
+        <a:font script="Thai" typeface="Angsana New"/>
+        <a:font script="Ethi" typeface="Nyala"/>
+        <a:font script="Beng" typeface="Vrinda"/>
+        <a:font script="Gujr" typeface="Shruti"/>
+        <a:font script="Khmr" typeface="MoolBoran"/>
+        <a:font script="Knda" typeface="Tunga"/>
+        <a:font script="Guru" typeface="Raavi"/>
+        <a:font script="Cans" typeface="Euphemia"/>
+        <a:font script="Cher" typeface="Plantagenet Cherokee"/>
+        <a:font script="Yiii" typeface="Microsoft Yi Baiti"/>
+        <a:font script="Tibt" typeface="Microsoft Himalaya"/>
+        <a:font script="Thaa" typeface="MV Boli"/>
+        <a:font script="Deva" typeface="Mangal"/>
+        <a:font script="Telu" typeface="Gautami"/>
+        <a:font script="Taml" typeface="Latha"/>
+        <a:font script="Syrc" typeface="Estrangelo Edessa"/>
+        <a:font script="Orya" typeface="Kalinga"/>
+        <a:font script="Mlym" typeface="Kartika"/>
+        <a:font script="Laoo" typeface="DokChampa"/>
+        <a:font script="Sinh" typeface="Iskoola Pota"/>
+        <a:font script="Mong" typeface="Mongolian Baiti"/>
+        <a:font script="Viet" typeface="Times New Roman"/>
+        <a:font script="Uigh" typeface="Microsoft Uighur"/>
+        <a:font script="Geor" typeface="Sylfaen"/>
+      </a:majorFont>
+      <a:minorFont>
+        <a:latin typeface="Arial"/>
+        <a:ea typeface=""/>
+        <a:cs typeface=""/>
+        <a:font script="Jpan" typeface="ＭＳ Ｐゴシック"/>
+        <a:font script="Hang" typeface="맑은 고딕"/>
+        <a:font script="Hans" typeface="宋体"/>
+        <a:font script="Hant" typeface="新細明體"/>
+        <a:font script="Arab" typeface="Arial"/>
+        <a:font script="Hebr" typeface="Arial"/>
+        <a:font script="Thai" typeface="Cordia New"/>
+        <a:font script="Ethi" typeface="Nyala"/>
+        <a:font script="Beng" typeface="Vrinda"/>
+        <a:font script="Gujr" typeface="Shruti"/>
+        <a:font script="Khmr" typeface="DaunPenh"/>
+        <a:font script="Knda" typeface="Tunga"/>
+        <a:font script="Guru" typeface="Raavi"/>
+        <a:font script="Cans" typeface="Euphemia"/>
+        <a:font script="Cher" typeface="Plantagenet Cherokee"/>
+        <a:font script="Yiii" typeface="Microsoft Yi Baiti"/>
+        <a:font script="Tibt" typeface="Microsoft Himalaya"/>
+        <a:font script="Thaa" typeface="MV Boli"/>
+        <a:font script="Deva" typeface="Mangal"/>
+        <a:font script="Telu" typeface="Gautami"/>
+        <a:font script="Taml" typeface="Latha"/>
+        <a:font script="Syrc" typeface="Estrangelo Edessa"/>
+        <a:font script="Orya" typeface="Kalinga"/>
+        <a:font script="Mlym" typeface="Kartika"/>
+        <a:font script="Laoo" typeface="DokChampa"/>
+        <a:font script="Sinh" typeface="Iskoola Pota"/>
+        <a:font script="Mong" typeface="Mongolian Baiti"/>
+        <a:font script="Viet" typeface="Arial"/>
+        <a:font script="Uigh" typeface="Microsoft Uighur"/>
+        <a:font script="Geor" typeface="Sylfaen"/>
+      </a:minorFont>
+    </a:fontScheme>
+    <a:fmtScheme name="Office">
+      <a:fillStyleLst>
+        <a:solidFill>
+          <a:schemeClr val="phClr"/>
+        </a:solidFill>
+        <a:gradFill rotWithShape="1">
+          <a:gsLst>
+            <a:gs pos="0">
+              <a:schemeClr val="phClr">
+                <a:tint val="50000"/>
+                <a:satMod val="300000"/>
+              </a:schemeClr>
+            </a:gs>
+            <a:gs pos="35000">
+              <a:schemeClr val="phClr">
+                <a:tint val="37000"/>
+                <a:satMod val="300000"/>
+              </a:schemeClr>
+            </a:gs>
+            <a:gs pos="100000">
+              <a:schemeClr val="phClr">
+                <a:tint val="15000"/>
+                <a:satMod val="350000"/>
+              </a:schemeClr>
+            </a:gs>
+          </a:gsLst>
+          <a:lin ang="16200000" scaled="1"/>
+        </a:gradFill>
+        <a:gradFill rotWithShape="1">
+          <a:gsLst>
+            <a:gs pos="0">
+              <a:schemeClr val="phClr">
+                <a:tint val="100000"/>
+                <a:shade val="100000"/>
+                <a:satMod val="130000"/>
+              </a:schemeClr>
+            </a:gs>
+            <a:gs pos="100000">
+              <a:schemeClr val="phClr">
+                <a:tint val="50000"/>
+                <a:shade val="100000"/>
+                <a:satMod val="350000"/>
+              </a:schemeClr>
+            </a:gs>
+          </a:gsLst>
+          <a:lin ang="16200000" scaled="0"/>
+        </a:gradFill>
+      </a:fillStyleLst>
+      <a:lnStyleLst>
+        <a:ln w="9525" cap="flat" cmpd="sng" algn="ctr">
+          <a:solidFill>
+            <a:schemeClr val="phClr">
+              <a:shade val="95000"/>
+              <a:satMod val="105000"/>
+            </a:schemeClr>
+          </a:solidFill>
+          <a:prstDash val="solid"/>
+        </a:ln>
+        <a:ln w="25400" cap="flat" cmpd="sng" algn="ctr">
+          <a:solidFill>
+            <a:schemeClr val="phClr"/>
+          </a:solidFill>
+          <a:prstDash val="solid"/>
+        </a:ln>
+        <a:ln w="38100" cap="flat" cmpd="sng" algn="ctr">
+          <a:solidFill>
+            <a:schemeClr val="phClr"/>
+          </a:solidFill>
+          <a:prstDash val="solid"/>
+        </a:ln>
+      </a:lnStyleLst>
+      <a:effectStyleLst>
+        <a:effectStyle>
+          <a:effectLst>
+            <a:outerShdw blurRad="40000" dist="20000" dir="5400000" rotWithShape="0">
+              <a:srgbClr val="000000">
+                <a:alpha val="38000"/>
+              </a:srgbClr>
+            </a:outerShdw>
+          </a:effectLst>
+        </a:effectStyle>
+        <a:effectStyle>
+          <a:effectLst>
+            <a:outerShdw blurRad="40000" dist="23000" dir="5400000" rotWithShape="0">
+              <a:srgbClr val="000000">
+                <a:alpha val="35000"/>
+              </a:srgbClr>
+            </a:outerShdw>
+          </a:effectLst>
+        </a:effectStyle>
+        <a:effectStyle>
+          <a:effectLst>
+            <a:outerShdw blurRad="40000" dist="23000" dir="5400000" rotWithShape="0">
+              <a:srgbClr val="000000">
+                <a:alpha val="35000"/>
+              </a:srgbClr>
+            </a:outerShdw>
+          </a:effectLst>
+          <a:scene3d>
+            <a:camera prst="orthographicFront">
+              <a:rot lat="0" lon="0" rev="0"/>
+            </a:camera>
+            <a:lightRig rig="threePt" dir="t">
+              <a:rot lat="0" lon="0" rev="1200000"/>
+            </a:lightRig>
+          </a:scene3d>
+          <a:sp3d>
+            <a:bevelT w="63500" h="25400"/>
+          </a:sp3d>
+        </a:effectStyle>
+      </a:effectStyleLst>
+      <a:bgFillStyleLst>
+        <a:solidFill>
+          <a:schemeClr val="phClr"/>
+        </a:solidFill>
+        <a:gradFill rotWithShape="1">
+          <a:gsLst>
+            <a:gs pos="0">
+              <a:schemeClr val="phClr">
+                <a:tint val="40000"/>
+                <a:satMod val="350000"/>
+              </a:schemeClr>
+            </a:gs>
+            <a:gs pos="40000">
+              <a:schemeClr val="phClr">
+                <a:tint val="45000"/>
+                <a:shade val="99000"/>
+                <a:satMod val="350000"/>
+              </a:schemeClr>
+            </a:gs>
+            <a:gs pos="100000">
+              <a:schemeClr val="phClr">
+                <a:shade val="20000"/>
+                <a:satMod val="255000"/>
+              </a:schemeClr>
+            </a:gs>
+          </a:gsLst>
+          <a:path path="circle">
+            <a:fillToRect l="50000" t="-80000" r="50000" b="180000"/>
+          </a:path>
+        </a:gradFill>
+        <a:gradFill rotWithShape="1">
+          <a:gsLst>
+            <a:gs pos="0">
+              <a:schemeClr val="phClr">
+                <a:tint val="80000"/>
+                <a:satMod val="300000"/>
+              </a:schemeClr>
+            </a:gs>
+            <a:gs pos="100000">
+              <a:schemeClr val="phClr">
+                <a:shade val="30000"/>
+                <a:satMod val="200000"/>
+              </a:schemeClr>
+            </a:gs>
+          </a:gsLst>
+          <a:path path="circle">
+            <a:fillToRect l="50000" t="50000" r="50000" b="50000"/>
+          </a:path>
+        </a:gradFill>
+      </a:bgFillStyleLst>
+    </a:fmtScheme>
+  </a:themeElements>
+</a:theme>
+</file>
+
+<file path=ppt/theme/theme2.xml><?xml version="1.0" encoding="utf-8"?>
 <a:theme xmlns:a="http://schemas.openxmlformats.org/drawingml/2006/main" xmlns:r="http://schemas.openxmlformats.org/officeDocument/2006/relationships">
   <a:themeElements>
     <a:clrScheme name="Default">
@@ -9727,283 +10384,4 @@
     </a:fmtScheme>
   </a:themeElements>
 </a:theme>
-</file>
-
-<file path=ppt/theme/theme2.xml><?xml version="1.0" encoding="utf-8"?>
-<a:theme xmlns:a="http://schemas.openxmlformats.org/drawingml/2006/main" xmlns:r="http://schemas.openxmlformats.org/officeDocument/2006/relationships" name="Marina">
-  <a:themeElements>
-    <a:clrScheme name="Marina">
-      <a:dk1>
-        <a:srgbClr val="FFFFFF"/>
-      </a:dk1>
-      <a:lt1>
-        <a:srgbClr val="00517C"/>
-      </a:lt1>
-      <a:dk2>
-        <a:srgbClr val="004065"/>
-      </a:dk2>
-      <a:lt2>
-        <a:srgbClr val="CFD8DC"/>
-      </a:lt2>
-      <a:accent1>
-        <a:srgbClr val="0277BD"/>
-      </a:accent1>
-      <a:accent2>
-        <a:srgbClr val="558B2F"/>
-      </a:accent2>
-      <a:accent3>
-        <a:srgbClr val="009688"/>
-      </a:accent3>
-      <a:accent4>
-        <a:srgbClr val="039BE5"/>
-      </a:accent4>
-      <a:accent5>
-        <a:srgbClr val="8BC34A"/>
-      </a:accent5>
-      <a:accent6>
-        <a:srgbClr val="FFEB38"/>
-      </a:accent6>
-      <a:hlink>
-        <a:srgbClr val="8BC34A"/>
-      </a:hlink>
-      <a:folHlink>
-        <a:srgbClr val="8BC34A"/>
-      </a:folHlink>
-    </a:clrScheme>
-    <a:fontScheme name="Office">
-      <a:majorFont>
-        <a:latin typeface="Arial"/>
-        <a:ea typeface=""/>
-        <a:cs typeface=""/>
-        <a:font script="Jpan" typeface="ＭＳ Ｐゴシック"/>
-        <a:font script="Hang" typeface="맑은 고딕"/>
-        <a:font script="Hans" typeface="宋体"/>
-        <a:font script="Hant" typeface="新細明體"/>
-        <a:font script="Arab" typeface="Times New Roman"/>
-        <a:font script="Hebr" typeface="Times New Roman"/>
-        <a:font script="Thai" typeface="Angsana New"/>
-        <a:font script="Ethi" typeface="Nyala"/>
-        <a:font script="Beng" typeface="Vrinda"/>
-        <a:font script="Gujr" typeface="Shruti"/>
-        <a:font script="Khmr" typeface="MoolBoran"/>
-        <a:font script="Knda" typeface="Tunga"/>
-        <a:font script="Guru" typeface="Raavi"/>
-        <a:font script="Cans" typeface="Euphemia"/>
-        <a:font script="Cher" typeface="Plantagenet Cherokee"/>
-        <a:font script="Yiii" typeface="Microsoft Yi Baiti"/>
-        <a:font script="Tibt" typeface="Microsoft Himalaya"/>
-        <a:font script="Thaa" typeface="MV Boli"/>
-        <a:font script="Deva" typeface="Mangal"/>
-        <a:font script="Telu" typeface="Gautami"/>
-        <a:font script="Taml" typeface="Latha"/>
-        <a:font script="Syrc" typeface="Estrangelo Edessa"/>
-        <a:font script="Orya" typeface="Kalinga"/>
-        <a:font script="Mlym" typeface="Kartika"/>
-        <a:font script="Laoo" typeface="DokChampa"/>
-        <a:font script="Sinh" typeface="Iskoola Pota"/>
-        <a:font script="Mong" typeface="Mongolian Baiti"/>
-        <a:font script="Viet" typeface="Times New Roman"/>
-        <a:font script="Uigh" typeface="Microsoft Uighur"/>
-        <a:font script="Geor" typeface="Sylfaen"/>
-      </a:majorFont>
-      <a:minorFont>
-        <a:latin typeface="Arial"/>
-        <a:ea typeface=""/>
-        <a:cs typeface=""/>
-        <a:font script="Jpan" typeface="ＭＳ Ｐゴシック"/>
-        <a:font script="Hang" typeface="맑은 고딕"/>
-        <a:font script="Hans" typeface="宋体"/>
-        <a:font script="Hant" typeface="新細明體"/>
-        <a:font script="Arab" typeface="Arial"/>
-        <a:font script="Hebr" typeface="Arial"/>
-        <a:font script="Thai" typeface="Cordia New"/>
-        <a:font script="Ethi" typeface="Nyala"/>
-        <a:font script="Beng" typeface="Vrinda"/>
-        <a:font script="Gujr" typeface="Shruti"/>
-        <a:font script="Khmr" typeface="DaunPenh"/>
-        <a:font script="Knda" typeface="Tunga"/>
-        <a:font script="Guru" typeface="Raavi"/>
-        <a:font script="Cans" typeface="Euphemia"/>
-        <a:font script="Cher" typeface="Plantagenet Cherokee"/>
-        <a:font script="Yiii" typeface="Microsoft Yi Baiti"/>
-        <a:font script="Tibt" typeface="Microsoft Himalaya"/>
-        <a:font script="Thaa" typeface="MV Boli"/>
-        <a:font script="Deva" typeface="Mangal"/>
-        <a:font script="Telu" typeface="Gautami"/>
-        <a:font script="Taml" typeface="Latha"/>
-        <a:font script="Syrc" typeface="Estrangelo Edessa"/>
-        <a:font script="Orya" typeface="Kalinga"/>
-        <a:font script="Mlym" typeface="Kartika"/>
-        <a:font script="Laoo" typeface="DokChampa"/>
-        <a:font script="Sinh" typeface="Iskoola Pota"/>
-        <a:font script="Mong" typeface="Mongolian Baiti"/>
-        <a:font script="Viet" typeface="Arial"/>
-        <a:font script="Uigh" typeface="Microsoft Uighur"/>
-        <a:font script="Geor" typeface="Sylfaen"/>
-      </a:minorFont>
-    </a:fontScheme>
-    <a:fmtScheme name="Office">
-      <a:fillStyleLst>
-        <a:solidFill>
-          <a:schemeClr val="phClr"/>
-        </a:solidFill>
-        <a:gradFill rotWithShape="1">
-          <a:gsLst>
-            <a:gs pos="0">
-              <a:schemeClr val="phClr">
-                <a:tint val="50000"/>
-                <a:satMod val="300000"/>
-              </a:schemeClr>
-            </a:gs>
-            <a:gs pos="35000">
-              <a:schemeClr val="phClr">
-                <a:tint val="37000"/>
-                <a:satMod val="300000"/>
-              </a:schemeClr>
-            </a:gs>
-            <a:gs pos="100000">
-              <a:schemeClr val="phClr">
-                <a:tint val="15000"/>
-                <a:satMod val="350000"/>
-              </a:schemeClr>
-            </a:gs>
-          </a:gsLst>
-          <a:lin ang="16200000" scaled="1"/>
-        </a:gradFill>
-        <a:gradFill rotWithShape="1">
-          <a:gsLst>
-            <a:gs pos="0">
-              <a:schemeClr val="phClr">
-                <a:tint val="100000"/>
-                <a:shade val="100000"/>
-                <a:satMod val="130000"/>
-              </a:schemeClr>
-            </a:gs>
-            <a:gs pos="100000">
-              <a:schemeClr val="phClr">
-                <a:tint val="50000"/>
-                <a:shade val="100000"/>
-                <a:satMod val="350000"/>
-              </a:schemeClr>
-            </a:gs>
-          </a:gsLst>
-          <a:lin ang="16200000" scaled="0"/>
-        </a:gradFill>
-      </a:fillStyleLst>
-      <a:lnStyleLst>
-        <a:ln w="9525" cap="flat" cmpd="sng" algn="ctr">
-          <a:solidFill>
-            <a:schemeClr val="phClr">
-              <a:shade val="95000"/>
-              <a:satMod val="105000"/>
-            </a:schemeClr>
-          </a:solidFill>
-          <a:prstDash val="solid"/>
-        </a:ln>
-        <a:ln w="25400" cap="flat" cmpd="sng" algn="ctr">
-          <a:solidFill>
-            <a:schemeClr val="phClr"/>
-          </a:solidFill>
-          <a:prstDash val="solid"/>
-        </a:ln>
-        <a:ln w="38100" cap="flat" cmpd="sng" algn="ctr">
-          <a:solidFill>
-            <a:schemeClr val="phClr"/>
-          </a:solidFill>
-          <a:prstDash val="solid"/>
-        </a:ln>
-      </a:lnStyleLst>
-      <a:effectStyleLst>
-        <a:effectStyle>
-          <a:effectLst>
-            <a:outerShdw blurRad="40000" dist="20000" dir="5400000" rotWithShape="0">
-              <a:srgbClr val="000000">
-                <a:alpha val="38000"/>
-              </a:srgbClr>
-            </a:outerShdw>
-          </a:effectLst>
-        </a:effectStyle>
-        <a:effectStyle>
-          <a:effectLst>
-            <a:outerShdw blurRad="40000" dist="23000" dir="5400000" rotWithShape="0">
-              <a:srgbClr val="000000">
-                <a:alpha val="35000"/>
-              </a:srgbClr>
-            </a:outerShdw>
-          </a:effectLst>
-        </a:effectStyle>
-        <a:effectStyle>
-          <a:effectLst>
-            <a:outerShdw blurRad="40000" dist="23000" dir="5400000" rotWithShape="0">
-              <a:srgbClr val="000000">
-                <a:alpha val="35000"/>
-              </a:srgbClr>
-            </a:outerShdw>
-          </a:effectLst>
-          <a:scene3d>
-            <a:camera prst="orthographicFront">
-              <a:rot lat="0" lon="0" rev="0"/>
-            </a:camera>
-            <a:lightRig rig="threePt" dir="t">
-              <a:rot lat="0" lon="0" rev="1200000"/>
-            </a:lightRig>
-          </a:scene3d>
-          <a:sp3d>
-            <a:bevelT w="63500" h="25400"/>
-          </a:sp3d>
-        </a:effectStyle>
-      </a:effectStyleLst>
-      <a:bgFillStyleLst>
-        <a:solidFill>
-          <a:schemeClr val="phClr"/>
-        </a:solidFill>
-        <a:gradFill rotWithShape="1">
-          <a:gsLst>
-            <a:gs pos="0">
-              <a:schemeClr val="phClr">
-                <a:tint val="40000"/>
-                <a:satMod val="350000"/>
-              </a:schemeClr>
-            </a:gs>
-            <a:gs pos="40000">
-              <a:schemeClr val="phClr">
-                <a:tint val="45000"/>
-                <a:shade val="99000"/>
-                <a:satMod val="350000"/>
-              </a:schemeClr>
-            </a:gs>
-            <a:gs pos="100000">
-              <a:schemeClr val="phClr">
-                <a:shade val="20000"/>
-                <a:satMod val="255000"/>
-              </a:schemeClr>
-            </a:gs>
-          </a:gsLst>
-          <a:path path="circle">
-            <a:fillToRect l="50000" t="-80000" r="50000" b="180000"/>
-          </a:path>
-        </a:gradFill>
-        <a:gradFill rotWithShape="1">
-          <a:gsLst>
-            <a:gs pos="0">
-              <a:schemeClr val="phClr">
-                <a:tint val="80000"/>
-                <a:satMod val="300000"/>
-              </a:schemeClr>
-            </a:gs>
-            <a:gs pos="100000">
-              <a:schemeClr val="phClr">
-                <a:shade val="30000"/>
-                <a:satMod val="200000"/>
-              </a:schemeClr>
-            </a:gs>
-          </a:gsLst>
-          <a:path path="circle">
-            <a:fillToRect l="50000" t="50000" r="50000" b="50000"/>
-          </a:path>
-        </a:gradFill>
-      </a:bgFillStyleLst>
-    </a:fmtScheme>
-  </a:themeElements>
-</a:theme>
 </file>
</xml_diff>